<commit_message>
Updated the template format
</commit_message>
<xml_diff>
--- a/template/template.pptx
+++ b/template/template.pptx
@@ -5825,10 +5825,10 @@
       </p:sp>
       <p:graphicFrame>
         <p:nvGraphicFramePr>
-          <p:cNvPr id="19" name="Table 18">
+          <p:cNvPr id="2" name="Table 1">
             <a:extLst>
               <a:ext uri="{FF2B5EF4-FFF2-40B4-BE49-F238E27FC236}">
-                <a16:creationId xmlns:a16="http://schemas.microsoft.com/office/drawing/2014/main" id="{0E276A9A-48E7-4341-B62A-4923D25BF3C7}"/>
+                <a16:creationId xmlns:a16="http://schemas.microsoft.com/office/drawing/2014/main" id="{462C5557-C632-4491-A57B-DAB699577EAE}"/>
               </a:ext>
             </a:extLst>
           </p:cNvPr>
@@ -5838,57 +5838,57 @@
           <p:nvPr>
             <p:extLst>
               <p:ext uri="{D42A27DB-BD31-4B8C-83A1-F6EECF244321}">
-                <p14:modId xmlns:p14="http://schemas.microsoft.com/office/powerpoint/2010/main" val="3137775934"/>
+                <p14:modId xmlns:p14="http://schemas.microsoft.com/office/powerpoint/2010/main" val="685561615"/>
               </p:ext>
             </p:extLst>
           </p:nvPr>
         </p:nvGraphicFramePr>
         <p:xfrm>
-          <a:off x="157779" y="1198935"/>
-          <a:ext cx="11876442" cy="3374136"/>
+          <a:off x="145464" y="1176363"/>
+          <a:ext cx="11901069" cy="2852919"/>
         </p:xfrm>
         <a:graphic>
           <a:graphicData uri="http://schemas.openxmlformats.org/drawingml/2006/table">
             <a:tbl>
               <a:tblPr/>
               <a:tblGrid>
-                <a:gridCol w="1753718">
+                <a:gridCol w="1757354">
                   <a:extLst>
                     <a:ext uri="{9D8B030D-6E8A-4147-A177-3AD203B41FA5}">
-                      <a16:colId xmlns:a16="http://schemas.microsoft.com/office/drawing/2014/main" val="3810652991"/>
+                      <a16:colId xmlns:a16="http://schemas.microsoft.com/office/drawing/2014/main" val="3918872628"/>
                     </a:ext>
                   </a:extLst>
                 </a:gridCol>
-                <a:gridCol w="2108901">
+                <a:gridCol w="2113274">
                   <a:extLst>
                     <a:ext uri="{9D8B030D-6E8A-4147-A177-3AD203B41FA5}">
-                      <a16:colId xmlns:a16="http://schemas.microsoft.com/office/drawing/2014/main" val="3439410186"/>
+                      <a16:colId xmlns:a16="http://schemas.microsoft.com/office/drawing/2014/main" val="2716186933"/>
                     </a:ext>
                   </a:extLst>
                 </a:gridCol>
-                <a:gridCol w="2219896">
+                <a:gridCol w="2224499">
                   <a:extLst>
                     <a:ext uri="{9D8B030D-6E8A-4147-A177-3AD203B41FA5}">
-                      <a16:colId xmlns:a16="http://schemas.microsoft.com/office/drawing/2014/main" val="542281018"/>
+                      <a16:colId xmlns:a16="http://schemas.microsoft.com/office/drawing/2014/main" val="1877756871"/>
                     </a:ext>
                   </a:extLst>
                 </a:gridCol>
-                <a:gridCol w="3041257">
+                <a:gridCol w="3047563">
                   <a:extLst>
                     <a:ext uri="{9D8B030D-6E8A-4147-A177-3AD203B41FA5}">
-                      <a16:colId xmlns:a16="http://schemas.microsoft.com/office/drawing/2014/main" val="1398381260"/>
+                      <a16:colId xmlns:a16="http://schemas.microsoft.com/office/drawing/2014/main" val="1934897279"/>
                     </a:ext>
                   </a:extLst>
                 </a:gridCol>
-                <a:gridCol w="2752670">
+                <a:gridCol w="2758379">
                   <a:extLst>
                     <a:ext uri="{9D8B030D-6E8A-4147-A177-3AD203B41FA5}">
-                      <a16:colId xmlns:a16="http://schemas.microsoft.com/office/drawing/2014/main" val="1292910454"/>
+                      <a16:colId xmlns:a16="http://schemas.microsoft.com/office/drawing/2014/main" val="1143194431"/>
                     </a:ext>
                   </a:extLst>
                 </a:gridCol>
               </a:tblGrid>
-              <a:tr h="374904">
+              <a:tr h="316991">
                 <a:tc>
                   <a:txBody>
                     <a:bodyPr/>
@@ -5896,18 +5896,18 @@
                     <a:p>
                       <a:pPr algn="l" fontAlgn="b"/>
                       <a:r>
-                        <a:rPr lang="en-US" sz="1500" b="0" i="0" u="none" strike="noStrike" dirty="0">
+                        <a:rPr lang="en-US" sz="1900" b="0" i="0" u="none" strike="noStrike" dirty="0">
                           <a:solidFill>
                             <a:srgbClr val="000000"/>
                           </a:solidFill>
                           <a:effectLst/>
                           <a:latin typeface="Calibri" panose="020F0502020204030204" pitchFamily="34" charset="0"/>
                         </a:rPr>
-                        <a:t>0</a:t>
+                        <a:t> 0 </a:t>
                       </a:r>
                     </a:p>
                   </a:txBody>
-                  <a:tcPr marL="6655" marR="6655" marT="6655" marB="0" anchor="b">
+                  <a:tcPr marL="8343" marR="8343" marT="8343" marB="0" anchor="b">
                     <a:lnL>
                       <a:noFill/>
                     </a:lnL>
@@ -5938,7 +5938,7 @@
                     <a:p>
                       <a:pPr algn="r" fontAlgn="ctr"/>
                       <a:r>
-                        <a:rPr lang="en-US" sz="1500" b="0" i="0" u="none" strike="noStrike" dirty="0">
+                        <a:rPr lang="en-US" sz="1900" b="0" i="0" u="none" strike="noStrike" dirty="0">
                           <a:solidFill>
                             <a:srgbClr val="000000"/>
                           </a:solidFill>
@@ -5949,7 +5949,7 @@
                       </a:r>
                     </a:p>
                   </a:txBody>
-                  <a:tcPr marL="6655" marR="6655" marT="6655" marB="0" anchor="ctr">
+                  <a:tcPr marL="8343" marR="8343" marT="8343" marB="0" anchor="ctr">
                     <a:lnL>
                       <a:noFill/>
                     </a:lnL>
@@ -5980,7 +5980,7 @@
                     <a:p>
                       <a:pPr algn="r" fontAlgn="ctr"/>
                       <a:r>
-                        <a:rPr lang="en-US" sz="1500" b="0" i="0" u="none" strike="noStrike" dirty="0">
+                        <a:rPr lang="en-US" sz="1900" b="0" i="0" u="none" strike="noStrike" dirty="0">
                           <a:solidFill>
                             <a:srgbClr val="000000"/>
                           </a:solidFill>
@@ -5991,7 +5991,7 @@
                       </a:r>
                     </a:p>
                   </a:txBody>
-                  <a:tcPr marL="6655" marR="6655" marT="6655" marB="0" anchor="ctr">
+                  <a:tcPr marL="8343" marR="8343" marT="8343" marB="0" anchor="ctr">
                     <a:lnL>
                       <a:noFill/>
                     </a:lnL>
@@ -6022,7 +6022,7 @@
                     <a:p>
                       <a:pPr algn="r" fontAlgn="ctr"/>
                       <a:r>
-                        <a:rPr lang="en-US" sz="1500" b="0" i="0" u="none" strike="noStrike" dirty="0">
+                        <a:rPr lang="en-US" sz="1900" b="0" i="0" u="none" strike="noStrike" dirty="0">
                           <a:solidFill>
                             <a:srgbClr val="000000"/>
                           </a:solidFill>
@@ -6033,7 +6033,7 @@
                       </a:r>
                     </a:p>
                   </a:txBody>
-                  <a:tcPr marL="6655" marR="6655" marT="6655" marB="0" anchor="ctr">
+                  <a:tcPr marL="8343" marR="8343" marT="8343" marB="0" anchor="ctr">
                     <a:lnL>
                       <a:noFill/>
                     </a:lnL>
@@ -6064,7 +6064,7 @@
                     <a:p>
                       <a:pPr algn="r" fontAlgn="ctr"/>
                       <a:r>
-                        <a:rPr lang="en-US" sz="1500" b="0" i="0" u="none" strike="noStrike" dirty="0">
+                        <a:rPr lang="en-US" sz="1900" b="0" i="0" u="none" strike="noStrike" dirty="0">
                           <a:solidFill>
                             <a:srgbClr val="000000"/>
                           </a:solidFill>
@@ -6075,7 +6075,7 @@
                       </a:r>
                     </a:p>
                   </a:txBody>
-                  <a:tcPr marL="6655" marR="6655" marT="6655" marB="0" anchor="ctr">
+                  <a:tcPr marL="8343" marR="8343" marT="8343" marB="0" anchor="ctr">
                     <a:lnL>
                       <a:noFill/>
                     </a:lnL>
@@ -6101,11 +6101,11 @@
                 </a:tc>
                 <a:extLst>
                   <a:ext uri="{0D108BD9-81ED-4DB2-BD59-A6C34878D82A}">
-                    <a16:rowId xmlns:a16="http://schemas.microsoft.com/office/drawing/2014/main" val="457681125"/>
+                    <a16:rowId xmlns:a16="http://schemas.microsoft.com/office/drawing/2014/main" val="2565195610"/>
                   </a:ext>
                 </a:extLst>
               </a:tr>
-              <a:tr h="374904">
+              <a:tr h="316991">
                 <a:tc>
                   <a:txBody>
                     <a:bodyPr/>
@@ -6113,7 +6113,40 @@
                     <a:p>
                       <a:pPr algn="l" fontAlgn="b"/>
                       <a:r>
-                        <a:rPr lang="en-US" sz="1500" b="0" i="0" u="none" strike="noStrike" dirty="0">
+                        <a:rPr lang="en-US" sz="1900" b="0" i="0" u="none" strike="noStrike" dirty="0">
+                          <a:solidFill>
+                            <a:srgbClr val="000000"/>
+                          </a:solidFill>
+                          <a:effectLst/>
+                          <a:latin typeface="Calibri" panose="020F0502020204030204" pitchFamily="34" charset="0"/>
+                        </a:rPr>
+                        <a:t> 0 </a:t>
+                      </a:r>
+                    </a:p>
+                  </a:txBody>
+                  <a:tcPr marL="8343" marR="8343" marT="8343" marB="0" anchor="b">
+                    <a:lnL>
+                      <a:noFill/>
+                    </a:lnL>
+                    <a:lnR>
+                      <a:noFill/>
+                    </a:lnR>
+                    <a:lnT>
+                      <a:noFill/>
+                    </a:lnT>
+                    <a:lnB>
+                      <a:noFill/>
+                    </a:lnB>
+                  </a:tcPr>
+                </a:tc>
+                <a:tc>
+                  <a:txBody>
+                    <a:bodyPr/>
+                    <a:lstStyle/>
+                    <a:p>
+                      <a:pPr algn="r" fontAlgn="ctr"/>
+                      <a:r>
+                        <a:rPr lang="en-US" sz="1900" b="0" i="0" u="none" strike="noStrike" dirty="0">
                           <a:solidFill>
                             <a:srgbClr val="000000"/>
                           </a:solidFill>
@@ -6124,7 +6157,7 @@
                       </a:r>
                     </a:p>
                   </a:txBody>
-                  <a:tcPr marL="6655" marR="6655" marT="6655" marB="0" anchor="b">
+                  <a:tcPr marL="8343" marR="8343" marT="8343" marB="0" anchor="ctr">
                     <a:lnL>
                       <a:noFill/>
                     </a:lnL>
@@ -6146,7 +6179,7 @@
                     <a:p>
                       <a:pPr algn="r" fontAlgn="ctr"/>
                       <a:r>
-                        <a:rPr lang="en-US" sz="1500" b="0" i="0" u="none" strike="noStrike" dirty="0">
+                        <a:rPr lang="en-US" sz="1900" b="0" i="0" u="none" strike="noStrike" dirty="0">
                           <a:solidFill>
                             <a:srgbClr val="000000"/>
                           </a:solidFill>
@@ -6157,7 +6190,7 @@
                       </a:r>
                     </a:p>
                   </a:txBody>
-                  <a:tcPr marL="6655" marR="6655" marT="6655" marB="0" anchor="ctr">
+                  <a:tcPr marL="8343" marR="8343" marT="8343" marB="0" anchor="ctr">
                     <a:lnL>
                       <a:noFill/>
                     </a:lnL>
@@ -6179,7 +6212,7 @@
                     <a:p>
                       <a:pPr algn="r" fontAlgn="ctr"/>
                       <a:r>
-                        <a:rPr lang="en-US" sz="1500" b="0" i="0" u="none" strike="noStrike" dirty="0">
+                        <a:rPr lang="en-US" sz="1900" b="0" i="0" u="none" strike="noStrike" dirty="0">
                           <a:solidFill>
                             <a:srgbClr val="000000"/>
                           </a:solidFill>
@@ -6190,7 +6223,7 @@
                       </a:r>
                     </a:p>
                   </a:txBody>
-                  <a:tcPr marL="6655" marR="6655" marT="6655" marB="0" anchor="ctr">
+                  <a:tcPr marL="8343" marR="8343" marT="8343" marB="0" anchor="ctr">
                     <a:lnL>
                       <a:noFill/>
                     </a:lnL>
@@ -6212,7 +6245,7 @@
                     <a:p>
                       <a:pPr algn="r" fontAlgn="ctr"/>
                       <a:r>
-                        <a:rPr lang="en-US" sz="1500" b="0" i="0" u="none" strike="noStrike" dirty="0">
+                        <a:rPr lang="en-US" sz="1900" b="0" i="0" u="none" strike="noStrike" dirty="0">
                           <a:solidFill>
                             <a:srgbClr val="000000"/>
                           </a:solidFill>
@@ -6223,40 +6256,7 @@
                       </a:r>
                     </a:p>
                   </a:txBody>
-                  <a:tcPr marL="6655" marR="6655" marT="6655" marB="0" anchor="ctr">
-                    <a:lnL>
-                      <a:noFill/>
-                    </a:lnL>
-                    <a:lnR>
-                      <a:noFill/>
-                    </a:lnR>
-                    <a:lnT>
-                      <a:noFill/>
-                    </a:lnT>
-                    <a:lnB>
-                      <a:noFill/>
-                    </a:lnB>
-                  </a:tcPr>
-                </a:tc>
-                <a:tc>
-                  <a:txBody>
-                    <a:bodyPr/>
-                    <a:lstStyle/>
-                    <a:p>
-                      <a:pPr algn="r" fontAlgn="ctr"/>
-                      <a:r>
-                        <a:rPr lang="en-US" sz="1500" b="0" i="0" u="none" strike="noStrike" dirty="0">
-                          <a:solidFill>
-                            <a:srgbClr val="000000"/>
-                          </a:solidFill>
-                          <a:effectLst/>
-                          <a:latin typeface="Calibri" panose="020F0502020204030204" pitchFamily="34" charset="0"/>
-                        </a:rPr>
-                        <a:t>0</a:t>
-                      </a:r>
-                    </a:p>
-                  </a:txBody>
-                  <a:tcPr marL="6655" marR="6655" marT="6655" marB="0" anchor="ctr">
+                  <a:tcPr marL="8343" marR="8343" marT="8343" marB="0" anchor="ctr">
                     <a:lnL>
                       <a:noFill/>
                     </a:lnL>
@@ -6273,11 +6273,11 @@
                 </a:tc>
                 <a:extLst>
                   <a:ext uri="{0D108BD9-81ED-4DB2-BD59-A6C34878D82A}">
-                    <a16:rowId xmlns:a16="http://schemas.microsoft.com/office/drawing/2014/main" val="4074675563"/>
+                    <a16:rowId xmlns:a16="http://schemas.microsoft.com/office/drawing/2014/main" val="889317383"/>
                   </a:ext>
                 </a:extLst>
               </a:tr>
-              <a:tr h="374904">
+              <a:tr h="316991">
                 <a:tc>
                   <a:txBody>
                     <a:bodyPr/>
@@ -6285,18 +6285,18 @@
                     <a:p>
                       <a:pPr algn="l" fontAlgn="b"/>
                       <a:r>
-                        <a:rPr lang="en-US" sz="1500" b="0" i="0" u="none" strike="noStrike" dirty="0">
+                        <a:rPr lang="en-US" sz="1900" b="0" i="0" u="none" strike="noStrike" dirty="0">
                           <a:solidFill>
                             <a:srgbClr val="000000"/>
                           </a:solidFill>
                           <a:effectLst/>
                           <a:latin typeface="Calibri" panose="020F0502020204030204" pitchFamily="34" charset="0"/>
                         </a:rPr>
-                        <a:t>0</a:t>
+                        <a:t> 0 </a:t>
                       </a:r>
                     </a:p>
                   </a:txBody>
-                  <a:tcPr marL="6655" marR="6655" marT="6655" marB="0" anchor="b">
+                  <a:tcPr marL="8343" marR="8343" marT="8343" marB="0" anchor="b">
                     <a:lnL>
                       <a:noFill/>
                     </a:lnL>
@@ -6321,7 +6321,7 @@
                     <a:p>
                       <a:pPr algn="r" fontAlgn="ctr"/>
                       <a:r>
-                        <a:rPr lang="en-US" sz="1500" b="0" i="0" u="none" strike="noStrike" dirty="0">
+                        <a:rPr lang="en-US" sz="1900" b="0" i="0" u="none" strike="noStrike" dirty="0">
                           <a:solidFill>
                             <a:srgbClr val="000000"/>
                           </a:solidFill>
@@ -6332,7 +6332,7 @@
                       </a:r>
                     </a:p>
                   </a:txBody>
-                  <a:tcPr marL="6655" marR="6655" marT="6655" marB="0" anchor="ctr">
+                  <a:tcPr marL="8343" marR="8343" marT="8343" marB="0" anchor="ctr">
                     <a:lnL>
                       <a:noFill/>
                     </a:lnL>
@@ -6357,7 +6357,7 @@
                     <a:p>
                       <a:pPr algn="r" fontAlgn="ctr"/>
                       <a:r>
-                        <a:rPr lang="en-US" sz="1500" b="0" i="0" u="none" strike="noStrike" dirty="0">
+                        <a:rPr lang="en-US" sz="1900" b="0" i="0" u="none" strike="noStrike" dirty="0">
                           <a:solidFill>
                             <a:srgbClr val="000000"/>
                           </a:solidFill>
@@ -6368,7 +6368,7 @@
                       </a:r>
                     </a:p>
                   </a:txBody>
-                  <a:tcPr marL="6655" marR="6655" marT="6655" marB="0" anchor="ctr">
+                  <a:tcPr marL="8343" marR="8343" marT="8343" marB="0" anchor="ctr">
                     <a:lnL>
                       <a:noFill/>
                     </a:lnL>
@@ -6393,7 +6393,7 @@
                     <a:p>
                       <a:pPr algn="r" fontAlgn="ctr"/>
                       <a:r>
-                        <a:rPr lang="en-US" sz="1500" b="0" i="0" u="none" strike="noStrike" dirty="0">
+                        <a:rPr lang="en-US" sz="1900" b="0" i="0" u="none" strike="noStrike" dirty="0">
                           <a:solidFill>
                             <a:srgbClr val="000000"/>
                           </a:solidFill>
@@ -6404,7 +6404,7 @@
                       </a:r>
                     </a:p>
                   </a:txBody>
-                  <a:tcPr marL="6655" marR="6655" marT="6655" marB="0" anchor="ctr">
+                  <a:tcPr marL="8343" marR="8343" marT="8343" marB="0" anchor="ctr">
                     <a:lnL>
                       <a:noFill/>
                     </a:lnL>
@@ -6429,7 +6429,7 @@
                     <a:p>
                       <a:pPr algn="r" fontAlgn="ctr"/>
                       <a:r>
-                        <a:rPr lang="en-US" sz="1500" b="0" i="0" u="none" strike="noStrike" dirty="0">
+                        <a:rPr lang="en-US" sz="1900" b="0" i="0" u="none" strike="noStrike" dirty="0">
                           <a:solidFill>
                             <a:srgbClr val="000000"/>
                           </a:solidFill>
@@ -6440,7 +6440,7 @@
                       </a:r>
                     </a:p>
                   </a:txBody>
-                  <a:tcPr marL="6655" marR="6655" marT="6655" marB="0" anchor="ctr">
+                  <a:tcPr marL="8343" marR="8343" marT="8343" marB="0" anchor="ctr">
                     <a:lnL>
                       <a:noFill/>
                     </a:lnL>
@@ -6460,11 +6460,11 @@
                 </a:tc>
                 <a:extLst>
                   <a:ext uri="{0D108BD9-81ED-4DB2-BD59-A6C34878D82A}">
-                    <a16:rowId xmlns:a16="http://schemas.microsoft.com/office/drawing/2014/main" val="2127703782"/>
+                    <a16:rowId xmlns:a16="http://schemas.microsoft.com/office/drawing/2014/main" val="2992049885"/>
                   </a:ext>
                 </a:extLst>
               </a:tr>
-              <a:tr h="374904">
+              <a:tr h="316991">
                 <a:tc>
                   <a:txBody>
                     <a:bodyPr/>
@@ -6472,7 +6472,40 @@
                     <a:p>
                       <a:pPr algn="l" fontAlgn="b"/>
                       <a:r>
-                        <a:rPr lang="en-US" sz="1500" b="0" i="0" u="none" strike="noStrike" dirty="0">
+                        <a:rPr lang="en-US" sz="1900" b="0" i="0" u="none" strike="noStrike" dirty="0">
+                          <a:solidFill>
+                            <a:srgbClr val="000000"/>
+                          </a:solidFill>
+                          <a:effectLst/>
+                          <a:latin typeface="Calibri" panose="020F0502020204030204" pitchFamily="34" charset="0"/>
+                        </a:rPr>
+                        <a:t> 0 </a:t>
+                      </a:r>
+                    </a:p>
+                  </a:txBody>
+                  <a:tcPr marL="8343" marR="8343" marT="8343" marB="0" anchor="b">
+                    <a:lnL>
+                      <a:noFill/>
+                    </a:lnL>
+                    <a:lnR>
+                      <a:noFill/>
+                    </a:lnR>
+                    <a:lnT>
+                      <a:noFill/>
+                    </a:lnT>
+                    <a:lnB>
+                      <a:noFill/>
+                    </a:lnB>
+                  </a:tcPr>
+                </a:tc>
+                <a:tc>
+                  <a:txBody>
+                    <a:bodyPr/>
+                    <a:lstStyle/>
+                    <a:p>
+                      <a:pPr algn="r" fontAlgn="ctr"/>
+                      <a:r>
+                        <a:rPr lang="en-US" sz="1900" b="0" i="0" u="none" strike="noStrike" dirty="0">
                           <a:solidFill>
                             <a:srgbClr val="000000"/>
                           </a:solidFill>
@@ -6483,7 +6516,7 @@
                       </a:r>
                     </a:p>
                   </a:txBody>
-                  <a:tcPr marL="6655" marR="6655" marT="6655" marB="0" anchor="b">
+                  <a:tcPr marL="8343" marR="8343" marT="8343" marB="0" anchor="ctr">
                     <a:lnL>
                       <a:noFill/>
                     </a:lnL>
@@ -6505,7 +6538,7 @@
                     <a:p>
                       <a:pPr algn="r" fontAlgn="ctr"/>
                       <a:r>
-                        <a:rPr lang="en-US" sz="1500" b="0" i="0" u="none" strike="noStrike" dirty="0">
+                        <a:rPr lang="en-US" sz="1900" b="0" i="0" u="none" strike="noStrike" dirty="0">
                           <a:solidFill>
                             <a:srgbClr val="000000"/>
                           </a:solidFill>
@@ -6516,7 +6549,7 @@
                       </a:r>
                     </a:p>
                   </a:txBody>
-                  <a:tcPr marL="6655" marR="6655" marT="6655" marB="0" anchor="ctr">
+                  <a:tcPr marL="8343" marR="8343" marT="8343" marB="0" anchor="ctr">
                     <a:lnL>
                       <a:noFill/>
                     </a:lnL>
@@ -6538,7 +6571,7 @@
                     <a:p>
                       <a:pPr algn="r" fontAlgn="ctr"/>
                       <a:r>
-                        <a:rPr lang="en-US" sz="1500" b="0" i="0" u="none" strike="noStrike" dirty="0">
+                        <a:rPr lang="en-US" sz="1900" b="0" i="0" u="none" strike="noStrike" dirty="0">
                           <a:solidFill>
                             <a:srgbClr val="000000"/>
                           </a:solidFill>
@@ -6549,7 +6582,7 @@
                       </a:r>
                     </a:p>
                   </a:txBody>
-                  <a:tcPr marL="6655" marR="6655" marT="6655" marB="0" anchor="ctr">
+                  <a:tcPr marL="8343" marR="8343" marT="8343" marB="0" anchor="ctr">
                     <a:lnL>
                       <a:noFill/>
                     </a:lnL>
@@ -6571,7 +6604,7 @@
                     <a:p>
                       <a:pPr algn="r" fontAlgn="ctr"/>
                       <a:r>
-                        <a:rPr lang="en-US" sz="1500" b="0" i="0" u="none" strike="noStrike" dirty="0">
+                        <a:rPr lang="en-US" sz="1900" b="0" i="0" u="none" strike="noStrike" dirty="0">
                           <a:solidFill>
                             <a:srgbClr val="000000"/>
                           </a:solidFill>
@@ -6582,40 +6615,7 @@
                       </a:r>
                     </a:p>
                   </a:txBody>
-                  <a:tcPr marL="6655" marR="6655" marT="6655" marB="0" anchor="ctr">
-                    <a:lnL>
-                      <a:noFill/>
-                    </a:lnL>
-                    <a:lnR>
-                      <a:noFill/>
-                    </a:lnR>
-                    <a:lnT>
-                      <a:noFill/>
-                    </a:lnT>
-                    <a:lnB>
-                      <a:noFill/>
-                    </a:lnB>
-                  </a:tcPr>
-                </a:tc>
-                <a:tc>
-                  <a:txBody>
-                    <a:bodyPr/>
-                    <a:lstStyle/>
-                    <a:p>
-                      <a:pPr algn="r" fontAlgn="ctr"/>
-                      <a:r>
-                        <a:rPr lang="en-US" sz="1500" b="0" i="0" u="none" strike="noStrike" dirty="0">
-                          <a:solidFill>
-                            <a:srgbClr val="000000"/>
-                          </a:solidFill>
-                          <a:effectLst/>
-                          <a:latin typeface="Calibri" panose="020F0502020204030204" pitchFamily="34" charset="0"/>
-                        </a:rPr>
-                        <a:t>0</a:t>
-                      </a:r>
-                    </a:p>
-                  </a:txBody>
-                  <a:tcPr marL="6655" marR="6655" marT="6655" marB="0" anchor="ctr">
+                  <a:tcPr marL="8343" marR="8343" marT="8343" marB="0" anchor="ctr">
                     <a:lnL>
                       <a:noFill/>
                     </a:lnL>
@@ -6632,11 +6632,11 @@
                 </a:tc>
                 <a:extLst>
                   <a:ext uri="{0D108BD9-81ED-4DB2-BD59-A6C34878D82A}">
-                    <a16:rowId xmlns:a16="http://schemas.microsoft.com/office/drawing/2014/main" val="3655485442"/>
+                    <a16:rowId xmlns:a16="http://schemas.microsoft.com/office/drawing/2014/main" val="1484877818"/>
                   </a:ext>
                 </a:extLst>
               </a:tr>
-              <a:tr h="374904">
+              <a:tr h="316991">
                 <a:tc>
                   <a:txBody>
                     <a:bodyPr/>
@@ -6644,18 +6644,18 @@
                     <a:p>
                       <a:pPr algn="l" fontAlgn="b"/>
                       <a:r>
-                        <a:rPr lang="en-US" sz="1500" b="0" i="0" u="none" strike="noStrike" dirty="0">
+                        <a:rPr lang="en-US" sz="1900" b="0" i="0" u="none" strike="noStrike" dirty="0">
                           <a:solidFill>
                             <a:srgbClr val="000000"/>
                           </a:solidFill>
                           <a:effectLst/>
                           <a:latin typeface="Calibri" panose="020F0502020204030204" pitchFamily="34" charset="0"/>
                         </a:rPr>
-                        <a:t>0</a:t>
+                        <a:t> 0 </a:t>
                       </a:r>
                     </a:p>
                   </a:txBody>
-                  <a:tcPr marL="6655" marR="6655" marT="6655" marB="0" anchor="b">
+                  <a:tcPr marL="8343" marR="8343" marT="8343" marB="0" anchor="b">
                     <a:lnL>
                       <a:noFill/>
                     </a:lnL>
@@ -6680,7 +6680,7 @@
                     <a:p>
                       <a:pPr algn="r" fontAlgn="ctr"/>
                       <a:r>
-                        <a:rPr lang="en-US" sz="1500" b="0" i="0" u="none" strike="noStrike" dirty="0">
+                        <a:rPr lang="en-US" sz="1900" b="0" i="0" u="none" strike="noStrike" dirty="0">
                           <a:solidFill>
                             <a:srgbClr val="000000"/>
                           </a:solidFill>
@@ -6691,7 +6691,7 @@
                       </a:r>
                     </a:p>
                   </a:txBody>
-                  <a:tcPr marL="6655" marR="6655" marT="6655" marB="0" anchor="ctr">
+                  <a:tcPr marL="8343" marR="8343" marT="8343" marB="0" anchor="ctr">
                     <a:lnL>
                       <a:noFill/>
                     </a:lnL>
@@ -6716,7 +6716,7 @@
                     <a:p>
                       <a:pPr algn="r" fontAlgn="ctr"/>
                       <a:r>
-                        <a:rPr lang="en-US" sz="1500" b="0" i="0" u="none" strike="noStrike" dirty="0">
+                        <a:rPr lang="en-US" sz="1900" b="0" i="0" u="none" strike="noStrike" dirty="0">
                           <a:solidFill>
                             <a:srgbClr val="000000"/>
                           </a:solidFill>
@@ -6727,7 +6727,7 @@
                       </a:r>
                     </a:p>
                   </a:txBody>
-                  <a:tcPr marL="6655" marR="6655" marT="6655" marB="0" anchor="ctr">
+                  <a:tcPr marL="8343" marR="8343" marT="8343" marB="0" anchor="ctr">
                     <a:lnL>
                       <a:noFill/>
                     </a:lnL>
@@ -6752,7 +6752,7 @@
                     <a:p>
                       <a:pPr algn="r" fontAlgn="ctr"/>
                       <a:r>
-                        <a:rPr lang="en-US" sz="1500" b="0" i="0" u="none" strike="noStrike" dirty="0">
+                        <a:rPr lang="en-US" sz="1900" b="0" i="0" u="none" strike="noStrike" dirty="0">
                           <a:solidFill>
                             <a:srgbClr val="000000"/>
                           </a:solidFill>
@@ -6763,7 +6763,7 @@
                       </a:r>
                     </a:p>
                   </a:txBody>
-                  <a:tcPr marL="6655" marR="6655" marT="6655" marB="0" anchor="ctr">
+                  <a:tcPr marL="8343" marR="8343" marT="8343" marB="0" anchor="ctr">
                     <a:lnL>
                       <a:noFill/>
                     </a:lnL>
@@ -6788,7 +6788,7 @@
                     <a:p>
                       <a:pPr algn="r" fontAlgn="ctr"/>
                       <a:r>
-                        <a:rPr lang="en-US" sz="1500" b="0" i="0" u="none" strike="noStrike" dirty="0">
+                        <a:rPr lang="en-US" sz="1900" b="0" i="0" u="none" strike="noStrike" dirty="0">
                           <a:solidFill>
                             <a:srgbClr val="000000"/>
                           </a:solidFill>
@@ -6799,7 +6799,7 @@
                       </a:r>
                     </a:p>
                   </a:txBody>
-                  <a:tcPr marL="6655" marR="6655" marT="6655" marB="0" anchor="ctr">
+                  <a:tcPr marL="8343" marR="8343" marT="8343" marB="0" anchor="ctr">
                     <a:lnL>
                       <a:noFill/>
                     </a:lnL>
@@ -6819,11 +6819,11 @@
                 </a:tc>
                 <a:extLst>
                   <a:ext uri="{0D108BD9-81ED-4DB2-BD59-A6C34878D82A}">
-                    <a16:rowId xmlns:a16="http://schemas.microsoft.com/office/drawing/2014/main" val="1761274133"/>
+                    <a16:rowId xmlns:a16="http://schemas.microsoft.com/office/drawing/2014/main" val="455826076"/>
                   </a:ext>
                 </a:extLst>
               </a:tr>
-              <a:tr h="374904">
+              <a:tr h="316991">
                 <a:tc>
                   <a:txBody>
                     <a:bodyPr/>
@@ -6831,7 +6831,40 @@
                     <a:p>
                       <a:pPr algn="l" fontAlgn="b"/>
                       <a:r>
-                        <a:rPr lang="en-US" sz="1500" b="0" i="0" u="none" strike="noStrike" dirty="0">
+                        <a:rPr lang="en-US" sz="1900" b="0" i="0" u="none" strike="noStrike" dirty="0">
+                          <a:solidFill>
+                            <a:srgbClr val="000000"/>
+                          </a:solidFill>
+                          <a:effectLst/>
+                          <a:latin typeface="Calibri" panose="020F0502020204030204" pitchFamily="34" charset="0"/>
+                        </a:rPr>
+                        <a:t> 0 </a:t>
+                      </a:r>
+                    </a:p>
+                  </a:txBody>
+                  <a:tcPr marL="8343" marR="8343" marT="8343" marB="0" anchor="b">
+                    <a:lnL>
+                      <a:noFill/>
+                    </a:lnL>
+                    <a:lnR>
+                      <a:noFill/>
+                    </a:lnR>
+                    <a:lnT>
+                      <a:noFill/>
+                    </a:lnT>
+                    <a:lnB>
+                      <a:noFill/>
+                    </a:lnB>
+                  </a:tcPr>
+                </a:tc>
+                <a:tc>
+                  <a:txBody>
+                    <a:bodyPr/>
+                    <a:lstStyle/>
+                    <a:p>
+                      <a:pPr algn="r" fontAlgn="ctr"/>
+                      <a:r>
+                        <a:rPr lang="en-US" sz="1900" b="0" i="0" u="none" strike="noStrike" dirty="0">
                           <a:solidFill>
                             <a:srgbClr val="000000"/>
                           </a:solidFill>
@@ -6842,7 +6875,7 @@
                       </a:r>
                     </a:p>
                   </a:txBody>
-                  <a:tcPr marL="6655" marR="6655" marT="6655" marB="0" anchor="b">
+                  <a:tcPr marL="8343" marR="8343" marT="8343" marB="0" anchor="ctr">
                     <a:lnL>
                       <a:noFill/>
                     </a:lnL>
@@ -6864,7 +6897,7 @@
                     <a:p>
                       <a:pPr algn="r" fontAlgn="ctr"/>
                       <a:r>
-                        <a:rPr lang="en-US" sz="1500" b="0" i="0" u="none" strike="noStrike" dirty="0">
+                        <a:rPr lang="en-US" sz="1900" b="0" i="0" u="none" strike="noStrike" dirty="0">
                           <a:solidFill>
                             <a:srgbClr val="000000"/>
                           </a:solidFill>
@@ -6875,7 +6908,7 @@
                       </a:r>
                     </a:p>
                   </a:txBody>
-                  <a:tcPr marL="6655" marR="6655" marT="6655" marB="0" anchor="ctr">
+                  <a:tcPr marL="8343" marR="8343" marT="8343" marB="0" anchor="ctr">
                     <a:lnL>
                       <a:noFill/>
                     </a:lnL>
@@ -6897,7 +6930,7 @@
                     <a:p>
                       <a:pPr algn="r" fontAlgn="ctr"/>
                       <a:r>
-                        <a:rPr lang="en-US" sz="1500" b="0" i="0" u="none" strike="noStrike" dirty="0">
+                        <a:rPr lang="en-US" sz="1900" b="0" i="0" u="none" strike="noStrike" dirty="0">
                           <a:solidFill>
                             <a:srgbClr val="000000"/>
                           </a:solidFill>
@@ -6908,7 +6941,7 @@
                       </a:r>
                     </a:p>
                   </a:txBody>
-                  <a:tcPr marL="6655" marR="6655" marT="6655" marB="0" anchor="ctr">
+                  <a:tcPr marL="8343" marR="8343" marT="8343" marB="0" anchor="ctr">
                     <a:lnL>
                       <a:noFill/>
                     </a:lnL>
@@ -6930,7 +6963,7 @@
                     <a:p>
                       <a:pPr algn="r" fontAlgn="ctr"/>
                       <a:r>
-                        <a:rPr lang="en-US" sz="1500" b="0" i="0" u="none" strike="noStrike" dirty="0">
+                        <a:rPr lang="en-US" sz="1900" b="0" i="0" u="none" strike="noStrike" dirty="0">
                           <a:solidFill>
                             <a:srgbClr val="000000"/>
                           </a:solidFill>
@@ -6941,40 +6974,7 @@
                       </a:r>
                     </a:p>
                   </a:txBody>
-                  <a:tcPr marL="6655" marR="6655" marT="6655" marB="0" anchor="ctr">
-                    <a:lnL>
-                      <a:noFill/>
-                    </a:lnL>
-                    <a:lnR>
-                      <a:noFill/>
-                    </a:lnR>
-                    <a:lnT>
-                      <a:noFill/>
-                    </a:lnT>
-                    <a:lnB>
-                      <a:noFill/>
-                    </a:lnB>
-                  </a:tcPr>
-                </a:tc>
-                <a:tc>
-                  <a:txBody>
-                    <a:bodyPr/>
-                    <a:lstStyle/>
-                    <a:p>
-                      <a:pPr algn="r" fontAlgn="ctr"/>
-                      <a:r>
-                        <a:rPr lang="en-US" sz="1500" b="0" i="0" u="none" strike="noStrike" dirty="0">
-                          <a:solidFill>
-                            <a:srgbClr val="000000"/>
-                          </a:solidFill>
-                          <a:effectLst/>
-                          <a:latin typeface="Calibri" panose="020F0502020204030204" pitchFamily="34" charset="0"/>
-                        </a:rPr>
-                        <a:t>0</a:t>
-                      </a:r>
-                    </a:p>
-                  </a:txBody>
-                  <a:tcPr marL="6655" marR="6655" marT="6655" marB="0" anchor="ctr">
+                  <a:tcPr marL="8343" marR="8343" marT="8343" marB="0" anchor="ctr">
                     <a:lnL>
                       <a:noFill/>
                     </a:lnL>
@@ -6991,11 +6991,11 @@
                 </a:tc>
                 <a:extLst>
                   <a:ext uri="{0D108BD9-81ED-4DB2-BD59-A6C34878D82A}">
-                    <a16:rowId xmlns:a16="http://schemas.microsoft.com/office/drawing/2014/main" val="2893176977"/>
+                    <a16:rowId xmlns:a16="http://schemas.microsoft.com/office/drawing/2014/main" val="2610980948"/>
                   </a:ext>
                 </a:extLst>
               </a:tr>
-              <a:tr h="374904">
+              <a:tr h="316991">
                 <a:tc>
                   <a:txBody>
                     <a:bodyPr/>
@@ -7003,18 +7003,18 @@
                     <a:p>
                       <a:pPr algn="l" fontAlgn="b"/>
                       <a:r>
-                        <a:rPr lang="en-US" sz="1500" b="0" i="0" u="none" strike="noStrike" dirty="0">
+                        <a:rPr lang="en-US" sz="1900" b="0" i="0" u="none" strike="noStrike" dirty="0">
                           <a:solidFill>
                             <a:srgbClr val="000000"/>
                           </a:solidFill>
                           <a:effectLst/>
                           <a:latin typeface="Calibri" panose="020F0502020204030204" pitchFamily="34" charset="0"/>
                         </a:rPr>
-                        <a:t>0</a:t>
+                        <a:t> 0 </a:t>
                       </a:r>
                     </a:p>
                   </a:txBody>
-                  <a:tcPr marL="6655" marR="6655" marT="6655" marB="0" anchor="b">
+                  <a:tcPr marL="8343" marR="8343" marT="8343" marB="0" anchor="b">
                     <a:lnL>
                       <a:noFill/>
                     </a:lnL>
@@ -7039,7 +7039,7 @@
                     <a:p>
                       <a:pPr algn="r" fontAlgn="ctr"/>
                       <a:r>
-                        <a:rPr lang="en-US" sz="1500" b="0" i="0" u="none" strike="noStrike" dirty="0">
+                        <a:rPr lang="en-US" sz="1900" b="0" i="0" u="none" strike="noStrike" dirty="0">
                           <a:solidFill>
                             <a:srgbClr val="000000"/>
                           </a:solidFill>
@@ -7050,7 +7050,7 @@
                       </a:r>
                     </a:p>
                   </a:txBody>
-                  <a:tcPr marL="6655" marR="6655" marT="6655" marB="0" anchor="ctr">
+                  <a:tcPr marL="8343" marR="8343" marT="8343" marB="0" anchor="ctr">
                     <a:lnL>
                       <a:noFill/>
                     </a:lnL>
@@ -7075,7 +7075,7 @@
                     <a:p>
                       <a:pPr algn="r" fontAlgn="ctr"/>
                       <a:r>
-                        <a:rPr lang="en-US" sz="1500" b="0" i="0" u="none" strike="noStrike" dirty="0">
+                        <a:rPr lang="en-US" sz="1900" b="0" i="0" u="none" strike="noStrike" dirty="0">
                           <a:solidFill>
                             <a:srgbClr val="000000"/>
                           </a:solidFill>
@@ -7086,7 +7086,7 @@
                       </a:r>
                     </a:p>
                   </a:txBody>
-                  <a:tcPr marL="6655" marR="6655" marT="6655" marB="0" anchor="ctr">
+                  <a:tcPr marL="8343" marR="8343" marT="8343" marB="0" anchor="ctr">
                     <a:lnL>
                       <a:noFill/>
                     </a:lnL>
@@ -7111,7 +7111,7 @@
                     <a:p>
                       <a:pPr algn="r" fontAlgn="ctr"/>
                       <a:r>
-                        <a:rPr lang="en-US" sz="1500" b="0" i="0" u="none" strike="noStrike" dirty="0">
+                        <a:rPr lang="en-US" sz="1900" b="0" i="0" u="none" strike="noStrike" dirty="0">
                           <a:solidFill>
                             <a:srgbClr val="000000"/>
                           </a:solidFill>
@@ -7122,7 +7122,7 @@
                       </a:r>
                     </a:p>
                   </a:txBody>
-                  <a:tcPr marL="6655" marR="6655" marT="6655" marB="0" anchor="ctr">
+                  <a:tcPr marL="8343" marR="8343" marT="8343" marB="0" anchor="ctr">
                     <a:lnL>
                       <a:noFill/>
                     </a:lnL>
@@ -7147,7 +7147,7 @@
                     <a:p>
                       <a:pPr algn="r" fontAlgn="ctr"/>
                       <a:r>
-                        <a:rPr lang="en-US" sz="1500" b="0" i="0" u="none" strike="noStrike" dirty="0">
+                        <a:rPr lang="en-US" sz="1900" b="0" i="0" u="none" strike="noStrike" dirty="0">
                           <a:solidFill>
                             <a:srgbClr val="000000"/>
                           </a:solidFill>
@@ -7158,7 +7158,7 @@
                       </a:r>
                     </a:p>
                   </a:txBody>
-                  <a:tcPr marL="6655" marR="6655" marT="6655" marB="0" anchor="ctr">
+                  <a:tcPr marL="8343" marR="8343" marT="8343" marB="0" anchor="ctr">
                     <a:lnL>
                       <a:noFill/>
                     </a:lnL>
@@ -7178,11 +7178,11 @@
                 </a:tc>
                 <a:extLst>
                   <a:ext uri="{0D108BD9-81ED-4DB2-BD59-A6C34878D82A}">
-                    <a16:rowId xmlns:a16="http://schemas.microsoft.com/office/drawing/2014/main" val="1990149467"/>
+                    <a16:rowId xmlns:a16="http://schemas.microsoft.com/office/drawing/2014/main" val="1654634003"/>
                   </a:ext>
                 </a:extLst>
               </a:tr>
-              <a:tr h="374904">
+              <a:tr h="316991">
                 <a:tc>
                   <a:txBody>
                     <a:bodyPr/>
@@ -7190,7 +7190,40 @@
                     <a:p>
                       <a:pPr algn="l" fontAlgn="b"/>
                       <a:r>
-                        <a:rPr lang="en-US" sz="1500" b="0" i="0" u="none" strike="noStrike" dirty="0">
+                        <a:rPr lang="en-US" sz="1900" b="0" i="0" u="none" strike="noStrike" dirty="0">
+                          <a:solidFill>
+                            <a:srgbClr val="000000"/>
+                          </a:solidFill>
+                          <a:effectLst/>
+                          <a:latin typeface="Calibri" panose="020F0502020204030204" pitchFamily="34" charset="0"/>
+                        </a:rPr>
+                        <a:t> 0 </a:t>
+                      </a:r>
+                    </a:p>
+                  </a:txBody>
+                  <a:tcPr marL="8343" marR="8343" marT="8343" marB="0" anchor="b">
+                    <a:lnL>
+                      <a:noFill/>
+                    </a:lnL>
+                    <a:lnR>
+                      <a:noFill/>
+                    </a:lnR>
+                    <a:lnT>
+                      <a:noFill/>
+                    </a:lnT>
+                    <a:lnB>
+                      <a:noFill/>
+                    </a:lnB>
+                  </a:tcPr>
+                </a:tc>
+                <a:tc>
+                  <a:txBody>
+                    <a:bodyPr/>
+                    <a:lstStyle/>
+                    <a:p>
+                      <a:pPr algn="r" fontAlgn="ctr"/>
+                      <a:r>
+                        <a:rPr lang="en-US" sz="1900" b="0" i="0" u="none" strike="noStrike" dirty="0">
                           <a:solidFill>
                             <a:srgbClr val="000000"/>
                           </a:solidFill>
@@ -7201,7 +7234,7 @@
                       </a:r>
                     </a:p>
                   </a:txBody>
-                  <a:tcPr marL="6655" marR="6655" marT="6655" marB="0" anchor="b">
+                  <a:tcPr marL="8343" marR="8343" marT="8343" marB="0" anchor="ctr">
                     <a:lnL>
                       <a:noFill/>
                     </a:lnL>
@@ -7223,7 +7256,7 @@
                     <a:p>
                       <a:pPr algn="r" fontAlgn="ctr"/>
                       <a:r>
-                        <a:rPr lang="en-US" sz="1500" b="0" i="0" u="none" strike="noStrike" dirty="0">
+                        <a:rPr lang="en-US" sz="1900" b="0" i="0" u="none" strike="noStrike" dirty="0">
                           <a:solidFill>
                             <a:srgbClr val="000000"/>
                           </a:solidFill>
@@ -7234,7 +7267,7 @@
                       </a:r>
                     </a:p>
                   </a:txBody>
-                  <a:tcPr marL="6655" marR="6655" marT="6655" marB="0" anchor="ctr">
+                  <a:tcPr marL="8343" marR="8343" marT="8343" marB="0" anchor="ctr">
                     <a:lnL>
                       <a:noFill/>
                     </a:lnL>
@@ -7256,7 +7289,7 @@
                     <a:p>
                       <a:pPr algn="r" fontAlgn="ctr"/>
                       <a:r>
-                        <a:rPr lang="en-US" sz="1500" b="0" i="0" u="none" strike="noStrike" dirty="0">
+                        <a:rPr lang="en-US" sz="1900" b="0" i="0" u="none" strike="noStrike" dirty="0">
                           <a:solidFill>
                             <a:srgbClr val="000000"/>
                           </a:solidFill>
@@ -7267,7 +7300,7 @@
                       </a:r>
                     </a:p>
                   </a:txBody>
-                  <a:tcPr marL="6655" marR="6655" marT="6655" marB="0" anchor="ctr">
+                  <a:tcPr marL="8343" marR="8343" marT="8343" marB="0" anchor="ctr">
                     <a:lnL>
                       <a:noFill/>
                     </a:lnL>
@@ -7289,7 +7322,7 @@
                     <a:p>
                       <a:pPr algn="r" fontAlgn="ctr"/>
                       <a:r>
-                        <a:rPr lang="en-US" sz="1500" b="0" i="0" u="none" strike="noStrike" dirty="0">
+                        <a:rPr lang="en-US" sz="1900" b="0" i="0" u="none" strike="noStrike" dirty="0">
                           <a:solidFill>
                             <a:srgbClr val="000000"/>
                           </a:solidFill>
@@ -7300,40 +7333,7 @@
                       </a:r>
                     </a:p>
                   </a:txBody>
-                  <a:tcPr marL="6655" marR="6655" marT="6655" marB="0" anchor="ctr">
-                    <a:lnL>
-                      <a:noFill/>
-                    </a:lnL>
-                    <a:lnR>
-                      <a:noFill/>
-                    </a:lnR>
-                    <a:lnT>
-                      <a:noFill/>
-                    </a:lnT>
-                    <a:lnB>
-                      <a:noFill/>
-                    </a:lnB>
-                  </a:tcPr>
-                </a:tc>
-                <a:tc>
-                  <a:txBody>
-                    <a:bodyPr/>
-                    <a:lstStyle/>
-                    <a:p>
-                      <a:pPr algn="r" fontAlgn="ctr"/>
-                      <a:r>
-                        <a:rPr lang="en-US" sz="1500" b="0" i="0" u="none" strike="noStrike" dirty="0">
-                          <a:solidFill>
-                            <a:srgbClr val="000000"/>
-                          </a:solidFill>
-                          <a:effectLst/>
-                          <a:latin typeface="Calibri" panose="020F0502020204030204" pitchFamily="34" charset="0"/>
-                        </a:rPr>
-                        <a:t>0</a:t>
-                      </a:r>
-                    </a:p>
-                  </a:txBody>
-                  <a:tcPr marL="6655" marR="6655" marT="6655" marB="0" anchor="ctr">
+                  <a:tcPr marL="8343" marR="8343" marT="8343" marB="0" anchor="ctr">
                     <a:lnL>
                       <a:noFill/>
                     </a:lnL>
@@ -7350,11 +7350,11 @@
                 </a:tc>
                 <a:extLst>
                   <a:ext uri="{0D108BD9-81ED-4DB2-BD59-A6C34878D82A}">
-                    <a16:rowId xmlns:a16="http://schemas.microsoft.com/office/drawing/2014/main" val="2082731320"/>
+                    <a16:rowId xmlns:a16="http://schemas.microsoft.com/office/drawing/2014/main" val="1587188592"/>
                   </a:ext>
                 </a:extLst>
               </a:tr>
-              <a:tr h="374904">
+              <a:tr h="316991">
                 <a:tc>
                   <a:txBody>
                     <a:bodyPr/>
@@ -7362,18 +7362,18 @@
                     <a:p>
                       <a:pPr algn="l" fontAlgn="b"/>
                       <a:r>
-                        <a:rPr lang="en-US" sz="1500" b="0" i="0" u="none" strike="noStrike" dirty="0">
+                        <a:rPr lang="en-US" sz="1900" b="0" i="0" u="none" strike="noStrike" dirty="0">
                           <a:solidFill>
                             <a:srgbClr val="000000"/>
                           </a:solidFill>
                           <a:effectLst/>
                           <a:latin typeface="Calibri" panose="020F0502020204030204" pitchFamily="34" charset="0"/>
                         </a:rPr>
-                        <a:t>0</a:t>
+                        <a:t> 0 </a:t>
                       </a:r>
                     </a:p>
                   </a:txBody>
-                  <a:tcPr marL="6655" marR="6655" marT="6655" marB="0" anchor="b">
+                  <a:tcPr marL="8343" marR="8343" marT="8343" marB="0" anchor="b">
                     <a:lnL>
                       <a:noFill/>
                     </a:lnL>
@@ -7404,7 +7404,7 @@
                     <a:p>
                       <a:pPr algn="r" fontAlgn="ctr"/>
                       <a:r>
-                        <a:rPr lang="en-US" sz="1500" b="0" i="0" u="none" strike="noStrike" dirty="0">
+                        <a:rPr lang="en-US" sz="1900" b="0" i="0" u="none" strike="noStrike" dirty="0">
                           <a:solidFill>
                             <a:srgbClr val="000000"/>
                           </a:solidFill>
@@ -7415,7 +7415,7 @@
                       </a:r>
                     </a:p>
                   </a:txBody>
-                  <a:tcPr marL="6655" marR="6655" marT="6655" marB="0" anchor="ctr">
+                  <a:tcPr marL="8343" marR="8343" marT="8343" marB="0" anchor="ctr">
                     <a:lnL>
                       <a:noFill/>
                     </a:lnL>
@@ -7446,7 +7446,7 @@
                     <a:p>
                       <a:pPr algn="r" fontAlgn="ctr"/>
                       <a:r>
-                        <a:rPr lang="en-US" sz="1500" b="0" i="0" u="none" strike="noStrike" dirty="0">
+                        <a:rPr lang="en-US" sz="1900" b="0" i="0" u="none" strike="noStrike" dirty="0">
                           <a:solidFill>
                             <a:srgbClr val="000000"/>
                           </a:solidFill>
@@ -7457,7 +7457,7 @@
                       </a:r>
                     </a:p>
                   </a:txBody>
-                  <a:tcPr marL="6655" marR="6655" marT="6655" marB="0" anchor="ctr">
+                  <a:tcPr marL="8343" marR="8343" marT="8343" marB="0" anchor="ctr">
                     <a:lnL>
                       <a:noFill/>
                     </a:lnL>
@@ -7488,7 +7488,7 @@
                     <a:p>
                       <a:pPr algn="r" fontAlgn="ctr"/>
                       <a:r>
-                        <a:rPr lang="en-US" sz="1500" b="0" i="0" u="none" strike="noStrike" dirty="0">
+                        <a:rPr lang="en-US" sz="1900" b="0" i="0" u="none" strike="noStrike" dirty="0">
                           <a:solidFill>
                             <a:srgbClr val="000000"/>
                           </a:solidFill>
@@ -7499,7 +7499,7 @@
                       </a:r>
                     </a:p>
                   </a:txBody>
-                  <a:tcPr marL="6655" marR="6655" marT="6655" marB="0" anchor="ctr">
+                  <a:tcPr marL="8343" marR="8343" marT="8343" marB="0" anchor="ctr">
                     <a:lnL>
                       <a:noFill/>
                     </a:lnL>
@@ -7530,7 +7530,7 @@
                     <a:p>
                       <a:pPr algn="r" fontAlgn="ctr"/>
                       <a:r>
-                        <a:rPr lang="en-US" sz="1500" b="0" i="0" u="none" strike="noStrike" dirty="0">
+                        <a:rPr lang="en-US" sz="1900" b="0" i="0" u="none" strike="noStrike" dirty="0">
                           <a:solidFill>
                             <a:srgbClr val="000000"/>
                           </a:solidFill>
@@ -7541,7 +7541,7 @@
                       </a:r>
                     </a:p>
                   </a:txBody>
-                  <a:tcPr marL="6655" marR="6655" marT="6655" marB="0" anchor="ctr">
+                  <a:tcPr marL="8343" marR="8343" marT="8343" marB="0" anchor="ctr">
                     <a:lnL>
                       <a:noFill/>
                     </a:lnL>
@@ -7567,7 +7567,7 @@
                 </a:tc>
                 <a:extLst>
                   <a:ext uri="{0D108BD9-81ED-4DB2-BD59-A6C34878D82A}">
-                    <a16:rowId xmlns:a16="http://schemas.microsoft.com/office/drawing/2014/main" val="3562741626"/>
+                    <a16:rowId xmlns:a16="http://schemas.microsoft.com/office/drawing/2014/main" val="2415709951"/>
                   </a:ext>
                 </a:extLst>
               </a:tr>
@@ -7577,10 +7577,10 @@
       </p:graphicFrame>
       <p:graphicFrame>
         <p:nvGraphicFramePr>
-          <p:cNvPr id="18" name="Table 17">
+          <p:cNvPr id="5" name="Table 4">
             <a:extLst>
               <a:ext uri="{FF2B5EF4-FFF2-40B4-BE49-F238E27FC236}">
-                <a16:creationId xmlns:a16="http://schemas.microsoft.com/office/drawing/2014/main" id="{254C9F44-60EC-45E6-88B1-1EB2BE30B4BD}"/>
+                <a16:creationId xmlns:a16="http://schemas.microsoft.com/office/drawing/2014/main" id="{B05FDC3F-583B-46E0-BD2A-193005B4B86F}"/>
               </a:ext>
             </a:extLst>
           </p:cNvPr>
@@ -7590,57 +7590,57 @@
           <p:nvPr>
             <p:extLst>
               <p:ext uri="{D42A27DB-BD31-4B8C-83A1-F6EECF244321}">
-                <p14:modId xmlns:p14="http://schemas.microsoft.com/office/powerpoint/2010/main" val="3587787480"/>
+                <p14:modId xmlns:p14="http://schemas.microsoft.com/office/powerpoint/2010/main" val="3292049235"/>
               </p:ext>
             </p:extLst>
           </p:nvPr>
         </p:nvGraphicFramePr>
         <p:xfrm>
-          <a:off x="157779" y="824031"/>
-          <a:ext cx="11876442" cy="374904"/>
+          <a:off x="145465" y="859372"/>
+          <a:ext cx="11901069" cy="316991"/>
         </p:xfrm>
         <a:graphic>
           <a:graphicData uri="http://schemas.openxmlformats.org/drawingml/2006/table">
             <a:tbl>
               <a:tblPr/>
               <a:tblGrid>
-                <a:gridCol w="1753718">
+                <a:gridCol w="1757354">
                   <a:extLst>
                     <a:ext uri="{9D8B030D-6E8A-4147-A177-3AD203B41FA5}">
-                      <a16:colId xmlns:a16="http://schemas.microsoft.com/office/drawing/2014/main" val="1880658541"/>
+                      <a16:colId xmlns:a16="http://schemas.microsoft.com/office/drawing/2014/main" val="3918872628"/>
                     </a:ext>
                   </a:extLst>
                 </a:gridCol>
-                <a:gridCol w="2108901">
+                <a:gridCol w="2113274">
                   <a:extLst>
                     <a:ext uri="{9D8B030D-6E8A-4147-A177-3AD203B41FA5}">
-                      <a16:colId xmlns:a16="http://schemas.microsoft.com/office/drawing/2014/main" val="4032603692"/>
+                      <a16:colId xmlns:a16="http://schemas.microsoft.com/office/drawing/2014/main" val="2716186933"/>
                     </a:ext>
                   </a:extLst>
                 </a:gridCol>
-                <a:gridCol w="2219896">
+                <a:gridCol w="2224499">
                   <a:extLst>
                     <a:ext uri="{9D8B030D-6E8A-4147-A177-3AD203B41FA5}">
-                      <a16:colId xmlns:a16="http://schemas.microsoft.com/office/drawing/2014/main" val="712075846"/>
+                      <a16:colId xmlns:a16="http://schemas.microsoft.com/office/drawing/2014/main" val="1877756871"/>
                     </a:ext>
                   </a:extLst>
                 </a:gridCol>
-                <a:gridCol w="3041257">
+                <a:gridCol w="3047563">
                   <a:extLst>
                     <a:ext uri="{9D8B030D-6E8A-4147-A177-3AD203B41FA5}">
-                      <a16:colId xmlns:a16="http://schemas.microsoft.com/office/drawing/2014/main" val="3421272542"/>
+                      <a16:colId xmlns:a16="http://schemas.microsoft.com/office/drawing/2014/main" val="1934897279"/>
                     </a:ext>
                   </a:extLst>
                 </a:gridCol>
-                <a:gridCol w="2752670">
+                <a:gridCol w="2758379">
                   <a:extLst>
                     <a:ext uri="{9D8B030D-6E8A-4147-A177-3AD203B41FA5}">
-                      <a16:colId xmlns:a16="http://schemas.microsoft.com/office/drawing/2014/main" val="42186334"/>
+                      <a16:colId xmlns:a16="http://schemas.microsoft.com/office/drawing/2014/main" val="1143194431"/>
                     </a:ext>
                   </a:extLst>
                 </a:gridCol>
               </a:tblGrid>
-              <a:tr h="374904">
+              <a:tr h="316991">
                 <a:tc>
                   <a:txBody>
                     <a:bodyPr/>
@@ -7648,7 +7648,7 @@
                     <a:p>
                       <a:pPr algn="l" fontAlgn="b"/>
                       <a:r>
-                        <a:rPr lang="en-US" sz="1500" b="1" i="0" u="none" strike="noStrike" dirty="0">
+                        <a:rPr lang="en-US" sz="1900" b="1" i="0" u="none" strike="noStrike">
                           <a:solidFill>
                             <a:srgbClr val="FFFFFF"/>
                           </a:solidFill>
@@ -7657,26 +7657,9 @@
                         </a:rPr>
                         <a:t>Planet Name</a:t>
                       </a:r>
-                      <a:r>
-                        <a:rPr lang="en-US" sz="1500" b="1" i="0" u="none" strike="noStrike" baseline="30000" dirty="0">
-                          <a:solidFill>
-                            <a:srgbClr val="FFFFFF"/>
-                          </a:solidFill>
-                          <a:effectLst/>
-                          <a:latin typeface="Calibri" panose="020F0502020204030204" pitchFamily="34" charset="0"/>
-                        </a:rPr>
-                        <a:t>1</a:t>
-                      </a:r>
-                      <a:endParaRPr lang="en-US" sz="1500" b="1" i="0" u="none" strike="noStrike" dirty="0">
-                        <a:solidFill>
-                          <a:srgbClr val="FFFFFF"/>
-                        </a:solidFill>
-                        <a:effectLst/>
-                        <a:latin typeface="Calibri" panose="020F0502020204030204" pitchFamily="34" charset="0"/>
-                      </a:endParaRPr>
                     </a:p>
                   </a:txBody>
-                  <a:tcPr marL="6655" marR="6655" marT="6655" marB="0" anchor="b">
+                  <a:tcPr marL="8343" marR="8343" marT="8343" marB="0" anchor="b">
                     <a:lnL>
                       <a:noFill/>
                     </a:lnL>
@@ -7713,7 +7696,7 @@
                     <a:p>
                       <a:pPr algn="ctr" fontAlgn="b"/>
                       <a:r>
-                        <a:rPr lang="en-US" sz="1500" b="1" i="0" u="none" strike="noStrike" dirty="0">
+                        <a:rPr lang="en-US" sz="1900" b="1" i="0" u="none" strike="noStrike">
                           <a:solidFill>
                             <a:srgbClr val="FFFFFF"/>
                           </a:solidFill>
@@ -7724,7 +7707,7 @@
                       </a:r>
                     </a:p>
                   </a:txBody>
-                  <a:tcPr marL="6655" marR="6655" marT="6655" marB="0" anchor="b">
+                  <a:tcPr marL="8343" marR="8343" marT="8343" marB="0" anchor="b">
                     <a:lnL>
                       <a:noFill/>
                     </a:lnL>
@@ -7761,7 +7744,7 @@
                     <a:p>
                       <a:pPr algn="ctr" fontAlgn="b"/>
                       <a:r>
-                        <a:rPr lang="en-US" sz="1500" b="1" i="0" u="none" strike="noStrike">
+                        <a:rPr lang="en-US" sz="1900" b="1" i="0" u="none" strike="noStrike" dirty="0">
                           <a:solidFill>
                             <a:srgbClr val="FFFFFF"/>
                           </a:solidFill>
@@ -7772,7 +7755,7 @@
                       </a:r>
                     </a:p>
                   </a:txBody>
-                  <a:tcPr marL="6655" marR="6655" marT="6655" marB="0" anchor="b">
+                  <a:tcPr marL="8343" marR="8343" marT="8343" marB="0" anchor="b">
                     <a:lnL>
                       <a:noFill/>
                     </a:lnL>
@@ -7809,7 +7792,7 @@
                     <a:p>
                       <a:pPr algn="ctr" fontAlgn="b"/>
                       <a:r>
-                        <a:rPr lang="en-US" sz="1500" b="1" i="0" u="none" strike="noStrike" dirty="0">
+                        <a:rPr lang="en-US" sz="1900" b="1" i="0" u="none" strike="noStrike" dirty="0">
                           <a:solidFill>
                             <a:srgbClr val="FFFFFF"/>
                           </a:solidFill>
@@ -7818,26 +7801,9 @@
                         </a:rPr>
                         <a:t>Rotation Period (hours)</a:t>
                       </a:r>
-                      <a:r>
-                        <a:rPr lang="en-US" sz="1500" b="1" i="0" u="none" strike="noStrike" baseline="30000" dirty="0">
-                          <a:solidFill>
-                            <a:srgbClr val="FFFFFF"/>
-                          </a:solidFill>
-                          <a:effectLst/>
-                          <a:latin typeface="Calibri" panose="020F0502020204030204" pitchFamily="34" charset="0"/>
-                        </a:rPr>
-                        <a:t>2</a:t>
-                      </a:r>
-                      <a:endParaRPr lang="en-US" sz="1500" b="1" i="0" u="none" strike="noStrike" dirty="0">
-                        <a:solidFill>
-                          <a:srgbClr val="FFFFFF"/>
-                        </a:solidFill>
-                        <a:effectLst/>
-                        <a:latin typeface="Calibri" panose="020F0502020204030204" pitchFamily="34" charset="0"/>
-                      </a:endParaRPr>
                     </a:p>
                   </a:txBody>
-                  <a:tcPr marL="6655" marR="6655" marT="6655" marB="0" anchor="b">
+                  <a:tcPr marL="8343" marR="8343" marT="8343" marB="0" anchor="b">
                     <a:lnL>
                       <a:noFill/>
                     </a:lnL>
@@ -7874,7 +7840,7 @@
                     <a:p>
                       <a:pPr algn="ctr" fontAlgn="b"/>
                       <a:r>
-                        <a:rPr lang="en-US" sz="1500" b="1" i="0" u="none" strike="noStrike" dirty="0">
+                        <a:rPr lang="en-US" sz="1900" b="1" i="0" u="none" strike="noStrike" dirty="0">
                           <a:solidFill>
                             <a:srgbClr val="FFFFFF"/>
                           </a:solidFill>
@@ -7885,7 +7851,7 @@
                       </a:r>
                     </a:p>
                   </a:txBody>
-                  <a:tcPr marL="6655" marR="6655" marT="6655" marB="0" anchor="b">
+                  <a:tcPr marL="8343" marR="8343" marT="8343" marB="0" anchor="b">
                     <a:lnL>
                       <a:noFill/>
                     </a:lnL>
@@ -7917,7 +7883,7 @@
                 </a:tc>
                 <a:extLst>
                   <a:ext uri="{0D108BD9-81ED-4DB2-BD59-A6C34878D82A}">
-                    <a16:rowId xmlns:a16="http://schemas.microsoft.com/office/drawing/2014/main" val="153307980"/>
+                    <a16:rowId xmlns:a16="http://schemas.microsoft.com/office/drawing/2014/main" val="2309801670"/>
                   </a:ext>
                 </a:extLst>
               </a:tr>
@@ -8595,21 +8561,6 @@
 </file>
 
 <file path=customXml/item1.xml><?xml version="1.0" encoding="utf-8"?>
-<?mso-contentType ?>
-<FormTemplates xmlns="http://schemas.microsoft.com/sharepoint/v3/contenttype/forms">
-  <Display>DocumentLibraryForm</Display>
-  <Edit>DocumentLibraryForm</Edit>
-  <New>DocumentLibraryForm</New>
-</FormTemplates>
-</file>
-
-<file path=customXml/item2.xml><?xml version="1.0" encoding="utf-8"?>
-<p:properties xmlns:p="http://schemas.microsoft.com/office/2006/metadata/properties" xmlns:xsi="http://www.w3.org/2001/XMLSchema-instance" xmlns:pc="http://schemas.microsoft.com/office/infopath/2007/PartnerControls">
-  <documentManagement/>
-</p:properties>
-</file>
-
-<file path=customXml/item3.xml><?xml version="1.0" encoding="utf-8"?>
 <ct:contentTypeSchema xmlns:ct="http://schemas.microsoft.com/office/2006/metadata/contentType" xmlns:ma="http://schemas.microsoft.com/office/2006/metadata/properties/metaAttributes" ct:_="" ma:_="" ma:contentTypeName="Document" ma:contentTypeID="0x010100548D62BA23FF0F468B5FFFF91594D566" ma:contentTypeVersion="9" ma:contentTypeDescription="Create a new document." ma:contentTypeScope="" ma:versionID="16f3fe2556486a5ccce4b4b4ac6cd1cb">
   <xsd:schema xmlns:xsd="http://www.w3.org/2001/XMLSchema" xmlns:xs="http://www.w3.org/2001/XMLSchema" xmlns:p="http://schemas.microsoft.com/office/2006/metadata/properties" xmlns:ns3="2c041e44-a364-467f-bf27-6fe11c2c2393" xmlns:ns4="dc6a8fc8-0ade-4e4b-ad2c-852b046b9779" targetNamespace="http://schemas.microsoft.com/office/2006/metadata/properties" ma:root="true" ma:fieldsID="b2cc7646f00572100521caa66fa46e3b" ns3:_="" ns4:_="">
     <xsd:import namespace="2c041e44-a364-467f-bf27-6fe11c2c2393"/>
@@ -8806,24 +8757,22 @@
 </ct:contentTypeSchema>
 </file>
 
-<file path=customXml/itemProps1.xml><?xml version="1.0" encoding="utf-8"?>
-<ds:datastoreItem xmlns:ds="http://schemas.openxmlformats.org/officeDocument/2006/customXml" ds:itemID="{12660240-2139-4240-A2CB-E5CB7AE94DD5}">
-  <ds:schemaRefs>
-    <ds:schemaRef ds:uri="http://schemas.microsoft.com/sharepoint/v3/contenttype/forms"/>
-  </ds:schemaRefs>
-</ds:datastoreItem>
+<file path=customXml/item2.xml><?xml version="1.0" encoding="utf-8"?>
+<p:properties xmlns:p="http://schemas.microsoft.com/office/2006/metadata/properties" xmlns:xsi="http://www.w3.org/2001/XMLSchema-instance" xmlns:pc="http://schemas.microsoft.com/office/infopath/2007/PartnerControls">
+  <documentManagement/>
+</p:properties>
 </file>
 
-<file path=customXml/itemProps2.xml><?xml version="1.0" encoding="utf-8"?>
-<ds:datastoreItem xmlns:ds="http://schemas.openxmlformats.org/officeDocument/2006/customXml" ds:itemID="{16047B68-979A-4B44-BD8F-6A085C74354D}">
-  <ds:schemaRefs>
-    <ds:schemaRef ds:uri="http://schemas.microsoft.com/office/2006/metadata/properties"/>
-    <ds:schemaRef ds:uri="http://schemas.microsoft.com/office/infopath/2007/PartnerControls"/>
-  </ds:schemaRefs>
-</ds:datastoreItem>
+<file path=customXml/item3.xml><?xml version="1.0" encoding="utf-8"?>
+<?mso-contentType ?>
+<FormTemplates xmlns="http://schemas.microsoft.com/sharepoint/v3/contenttype/forms">
+  <Display>DocumentLibraryForm</Display>
+  <Edit>DocumentLibraryForm</Edit>
+  <New>DocumentLibraryForm</New>
+</FormTemplates>
 </file>
 
-<file path=customXml/itemProps3.xml><?xml version="1.0" encoding="utf-8"?>
+<file path=customXml/itemProps1.xml><?xml version="1.0" encoding="utf-8"?>
 <ds:datastoreItem xmlns:ds="http://schemas.openxmlformats.org/officeDocument/2006/customXml" ds:itemID="{FBB427ED-9670-410A-A6CE-ED96C3DF3D28}">
   <ds:schemaRefs>
     <ds:schemaRef ds:uri="http://schemas.microsoft.com/office/2006/metadata/contentType"/>
@@ -8840,4 +8789,21 @@
     <ds:schemaRef ds:uri="http://schemas.microsoft.com/internal/obd"/>
   </ds:schemaRefs>
 </ds:datastoreItem>
+</file>
+
+<file path=customXml/itemProps2.xml><?xml version="1.0" encoding="utf-8"?>
+<ds:datastoreItem xmlns:ds="http://schemas.openxmlformats.org/officeDocument/2006/customXml" ds:itemID="{16047B68-979A-4B44-BD8F-6A085C74354D}">
+  <ds:schemaRefs>
+    <ds:schemaRef ds:uri="http://schemas.microsoft.com/office/2006/metadata/properties"/>
+    <ds:schemaRef ds:uri="http://schemas.microsoft.com/office/infopath/2007/PartnerControls"/>
+  </ds:schemaRefs>
+</ds:datastoreItem>
+</file>
+
+<file path=customXml/itemProps3.xml><?xml version="1.0" encoding="utf-8"?>
+<ds:datastoreItem xmlns:ds="http://schemas.openxmlformats.org/officeDocument/2006/customXml" ds:itemID="{12660240-2139-4240-A2CB-E5CB7AE94DD5}">
+  <ds:schemaRefs>
+    <ds:schemaRef ds:uri="http://schemas.microsoft.com/sharepoint/v3/contenttype/forms"/>
+  </ds:schemaRefs>
+</ds:datastoreItem>
 </file>
</xml_diff>